<commit_message>
update and shift figures
</commit_message>
<xml_diff>
--- a/experiments/GSE125881/GSE125881_results.pptx
+++ b/experiments/GSE125881/GSE125881_results.pptx
@@ -3632,7 +3632,7 @@
         </p:blipFill>
         <p:spPr>
           <a:xfrm>
-            <a:off x="457200" y="914400"/>
+            <a:off x="228600" y="914400"/>
             <a:ext cx="3291840" cy="2743200"/>
           </a:xfrm>
           <a:prstGeom prst="rect">
@@ -3656,7 +3656,7 @@
         </p:blipFill>
         <p:spPr>
           <a:xfrm>
-            <a:off x="5029200" y="914400"/>
+            <a:off x="3886200" y="914400"/>
             <a:ext cx="3291840" cy="2743200"/>
           </a:xfrm>
           <a:prstGeom prst="rect">
@@ -3680,7 +3680,7 @@
         </p:blipFill>
         <p:spPr>
           <a:xfrm>
-            <a:off x="9601200" y="914400"/>
+            <a:off x="7543800" y="914400"/>
             <a:ext cx="3291840" cy="2743200"/>
           </a:xfrm>
           <a:prstGeom prst="rect">
@@ -3704,7 +3704,7 @@
         </p:blipFill>
         <p:spPr>
           <a:xfrm>
-            <a:off x="457200" y="4114800"/>
+            <a:off x="228600" y="4114800"/>
             <a:ext cx="3291840" cy="2743200"/>
           </a:xfrm>
           <a:prstGeom prst="rect">
@@ -3728,7 +3728,7 @@
         </p:blipFill>
         <p:spPr>
           <a:xfrm>
-            <a:off x="5029200" y="4114800"/>
+            <a:off x="3886200" y="4114800"/>
             <a:ext cx="3291840" cy="2743200"/>
           </a:xfrm>
           <a:prstGeom prst="rect">
@@ -3752,7 +3752,31 @@
         </p:blipFill>
         <p:spPr>
           <a:xfrm>
-            <a:off x="9601200" y="4114800"/>
+            <a:off x="7543800" y="4114800"/>
+            <a:ext cx="3291840" cy="2743200"/>
+          </a:xfrm>
+          <a:prstGeom prst="rect">
+            <a:avLst/>
+          </a:prstGeom>
+        </p:spPr>
+      </p:pic>
+      <p:pic>
+        <p:nvPicPr>
+          <p:cNvPr id="9" name="Picture 8" descr="GSE125881_prepare_umap_BBD_Tex.jpeg"/>
+          <p:cNvPicPr>
+            <a:picLocks noChangeAspect="1"/>
+          </p:cNvPicPr>
+          <p:nvPr/>
+        </p:nvPicPr>
+        <p:blipFill>
+          <a:blip r:embed="rId7"/>
+          <a:stretch>
+            <a:fillRect/>
+          </a:stretch>
+        </p:blipFill>
+        <p:spPr>
+          <a:xfrm>
+            <a:off x="11201400" y="4114800"/>
             <a:ext cx="3291840" cy="2743200"/>
           </a:xfrm>
           <a:prstGeom prst="rect">
@@ -3827,7 +3851,7 @@
         </p:blipFill>
         <p:spPr>
           <a:xfrm>
-            <a:off x="457200" y="914400"/>
+            <a:off x="228600" y="914400"/>
             <a:ext cx="3291840" cy="2743200"/>
           </a:xfrm>
           <a:prstGeom prst="rect">
@@ -3851,7 +3875,7 @@
         </p:blipFill>
         <p:spPr>
           <a:xfrm>
-            <a:off x="5029200" y="914400"/>
+            <a:off x="3886200" y="914400"/>
             <a:ext cx="3291840" cy="2743200"/>
           </a:xfrm>
           <a:prstGeom prst="rect">
@@ -3875,7 +3899,7 @@
         </p:blipFill>
         <p:spPr>
           <a:xfrm>
-            <a:off x="9601200" y="914400"/>
+            <a:off x="7543800" y="914400"/>
             <a:ext cx="3291840" cy="2743200"/>
           </a:xfrm>
           <a:prstGeom prst="rect">
@@ -3899,7 +3923,7 @@
         </p:blipFill>
         <p:spPr>
           <a:xfrm>
-            <a:off x="457200" y="4114800"/>
+            <a:off x="228600" y="4114800"/>
             <a:ext cx="3291840" cy="2743200"/>
           </a:xfrm>
           <a:prstGeom prst="rect">
@@ -3923,7 +3947,7 @@
         </p:blipFill>
         <p:spPr>
           <a:xfrm>
-            <a:off x="5029200" y="4114800"/>
+            <a:off x="3886200" y="4114800"/>
             <a:ext cx="3291840" cy="2743200"/>
           </a:xfrm>
           <a:prstGeom prst="rect">
@@ -3947,7 +3971,31 @@
         </p:blipFill>
         <p:spPr>
           <a:xfrm>
-            <a:off x="9601200" y="4114800"/>
+            <a:off x="7543800" y="4114800"/>
+            <a:ext cx="3291840" cy="2743200"/>
+          </a:xfrm>
+          <a:prstGeom prst="rect">
+            <a:avLst/>
+          </a:prstGeom>
+        </p:spPr>
+      </p:pic>
+      <p:pic>
+        <p:nvPicPr>
+          <p:cNvPr id="9" name="Picture 8" descr="GSE125881_query_agg_aggplot_PD1_Tex.jpeg"/>
+          <p:cNvPicPr>
+            <a:picLocks noChangeAspect="1"/>
+          </p:cNvPicPr>
+          <p:nvPr/>
+        </p:nvPicPr>
+        <p:blipFill>
+          <a:blip r:embed="rId8"/>
+          <a:stretch>
+            <a:fillRect/>
+          </a:stretch>
+        </p:blipFill>
+        <p:spPr>
+          <a:xfrm>
+            <a:off x="11201400" y="4114800"/>
             <a:ext cx="3291840" cy="2743200"/>
           </a:xfrm>
           <a:prstGeom prst="rect">
@@ -4209,7 +4257,7 @@
         </p:nvSpPr>
         <p:spPr>
           <a:xfrm>
-            <a:off x="7315200" y="5029200"/>
+            <a:off x="10972800" y="5029200"/>
             <a:ext cx="914400" cy="914400"/>
           </a:xfrm>
           <a:prstGeom prst="rect">
@@ -4250,6 +4298,11 @@
           <a:p>
             <a:r>
               <a:t>NT5E encodes CD73</a:t>
+            </a:r>
+          </a:p>
+          <a:p>
+            <a:r>
+              <a:t>ENTPD1 encodes CD39</a:t>
             </a:r>
           </a:p>
         </p:txBody>

</xml_diff>

<commit_message>
update and fix plot
</commit_message>
<xml_diff>
--- a/experiments/GSE125881/GSE125881_results.pptx
+++ b/experiments/GSE125881/GSE125881_results.pptx
@@ -3762,14 +3762,14 @@
       </p:pic>
       <p:pic>
         <p:nvPicPr>
-          <p:cNvPr id="9" name="Picture 8" descr="GSE125881_prepare_umap_BBD_Tex.jpeg"/>
+          <p:cNvPr id="9" name="Picture 8" descr="GSE125881_prepare_umap_PD1_Tex.jpeg"/>
           <p:cNvPicPr>
             <a:picLocks noChangeAspect="1"/>
           </p:cNvPicPr>
           <p:nvPr/>
         </p:nvPicPr>
         <p:blipFill>
-          <a:blip r:embed="rId7"/>
+          <a:blip r:embed="rId8"/>
           <a:stretch>
             <a:fillRect/>
           </a:stretch>

</xml_diff>